<commit_message>
Added mounted network folder icon
</commit_message>
<xml_diff>
--- a/Network Shapes.pptx
+++ b/Network Shapes.pptx
@@ -268,7 +268,7 @@
           <a:p>
             <a:fld id="{E83FFE37-C1F0-467D-A491-4333803291AA}" type="datetimeFigureOut">
               <a:rPr lang="en-US" smtClean="0"/>
-              <a:t>2/21/2022</a:t>
+              <a:t>9/29/2022</a:t>
             </a:fld>
             <a:endParaRPr lang="en-US"/>
           </a:p>
@@ -466,7 +466,7 @@
           <a:p>
             <a:fld id="{E83FFE37-C1F0-467D-A491-4333803291AA}" type="datetimeFigureOut">
               <a:rPr lang="en-US" smtClean="0"/>
-              <a:t>2/21/2022</a:t>
+              <a:t>9/29/2022</a:t>
             </a:fld>
             <a:endParaRPr lang="en-US"/>
           </a:p>
@@ -674,7 +674,7 @@
           <a:p>
             <a:fld id="{E83FFE37-C1F0-467D-A491-4333803291AA}" type="datetimeFigureOut">
               <a:rPr lang="en-US" smtClean="0"/>
-              <a:t>2/21/2022</a:t>
+              <a:t>9/29/2022</a:t>
             </a:fld>
             <a:endParaRPr lang="en-US"/>
           </a:p>
@@ -872,7 +872,7 @@
           <a:p>
             <a:fld id="{E83FFE37-C1F0-467D-A491-4333803291AA}" type="datetimeFigureOut">
               <a:rPr lang="en-US" smtClean="0"/>
-              <a:t>2/21/2022</a:t>
+              <a:t>9/29/2022</a:t>
             </a:fld>
             <a:endParaRPr lang="en-US"/>
           </a:p>
@@ -1147,7 +1147,7 @@
           <a:p>
             <a:fld id="{E83FFE37-C1F0-467D-A491-4333803291AA}" type="datetimeFigureOut">
               <a:rPr lang="en-US" smtClean="0"/>
-              <a:t>2/21/2022</a:t>
+              <a:t>9/29/2022</a:t>
             </a:fld>
             <a:endParaRPr lang="en-US"/>
           </a:p>
@@ -1412,7 +1412,7 @@
           <a:p>
             <a:fld id="{E83FFE37-C1F0-467D-A491-4333803291AA}" type="datetimeFigureOut">
               <a:rPr lang="en-US" smtClean="0"/>
-              <a:t>2/21/2022</a:t>
+              <a:t>9/29/2022</a:t>
             </a:fld>
             <a:endParaRPr lang="en-US"/>
           </a:p>
@@ -1824,7 +1824,7 @@
           <a:p>
             <a:fld id="{E83FFE37-C1F0-467D-A491-4333803291AA}" type="datetimeFigureOut">
               <a:rPr lang="en-US" smtClean="0"/>
-              <a:t>2/21/2022</a:t>
+              <a:t>9/29/2022</a:t>
             </a:fld>
             <a:endParaRPr lang="en-US"/>
           </a:p>
@@ -1965,7 +1965,7 @@
           <a:p>
             <a:fld id="{E83FFE37-C1F0-467D-A491-4333803291AA}" type="datetimeFigureOut">
               <a:rPr lang="en-US" smtClean="0"/>
-              <a:t>2/21/2022</a:t>
+              <a:t>9/29/2022</a:t>
             </a:fld>
             <a:endParaRPr lang="en-US"/>
           </a:p>
@@ -2078,7 +2078,7 @@
           <a:p>
             <a:fld id="{E83FFE37-C1F0-467D-A491-4333803291AA}" type="datetimeFigureOut">
               <a:rPr lang="en-US" smtClean="0"/>
-              <a:t>2/21/2022</a:t>
+              <a:t>9/29/2022</a:t>
             </a:fld>
             <a:endParaRPr lang="en-US"/>
           </a:p>
@@ -2389,7 +2389,7 @@
           <a:p>
             <a:fld id="{E83FFE37-C1F0-467D-A491-4333803291AA}" type="datetimeFigureOut">
               <a:rPr lang="en-US" smtClean="0"/>
-              <a:t>2/21/2022</a:t>
+              <a:t>9/29/2022</a:t>
             </a:fld>
             <a:endParaRPr lang="en-US"/>
           </a:p>
@@ -2677,7 +2677,7 @@
           <a:p>
             <a:fld id="{E83FFE37-C1F0-467D-A491-4333803291AA}" type="datetimeFigureOut">
               <a:rPr lang="en-US" smtClean="0"/>
-              <a:t>2/21/2022</a:t>
+              <a:t>9/29/2022</a:t>
             </a:fld>
             <a:endParaRPr lang="en-US"/>
           </a:p>
@@ -2918,7 +2918,7 @@
           <a:p>
             <a:fld id="{E83FFE37-C1F0-467D-A491-4333803291AA}" type="datetimeFigureOut">
               <a:rPr lang="en-US" smtClean="0"/>
-              <a:t>2/21/2022</a:t>
+              <a:t>9/29/2022</a:t>
             </a:fld>
             <a:endParaRPr lang="en-US"/>
           </a:p>
@@ -6825,7 +6825,7 @@
         </p:nvGrpSpPr>
         <p:grpSpPr>
           <a:xfrm>
-            <a:off x="2699470" y="2066709"/>
+            <a:off x="2638345" y="2047977"/>
             <a:ext cx="1228725" cy="869565"/>
             <a:chOff x="2740094" y="2954132"/>
             <a:chExt cx="1228725" cy="869565"/>
@@ -9879,7 +9879,7 @@
         </p:nvGrpSpPr>
         <p:grpSpPr>
           <a:xfrm>
-            <a:off x="4496421" y="3396460"/>
+            <a:off x="4485572" y="3054722"/>
             <a:ext cx="916433" cy="645746"/>
             <a:chOff x="6007026" y="3011801"/>
             <a:chExt cx="916433" cy="645746"/>
@@ -11176,7 +11176,7 @@
         </p:nvGrpSpPr>
         <p:grpSpPr>
           <a:xfrm>
-            <a:off x="4361349" y="4595934"/>
+            <a:off x="4344252" y="4806989"/>
             <a:ext cx="1121258" cy="603509"/>
             <a:chOff x="5629012" y="4288115"/>
             <a:chExt cx="1121258" cy="603509"/>
@@ -11580,7 +11580,7 @@
         </p:nvGrpSpPr>
         <p:grpSpPr>
           <a:xfrm>
-            <a:off x="950813" y="4490605"/>
+            <a:off x="999254" y="4370231"/>
             <a:ext cx="1121258" cy="500416"/>
             <a:chOff x="6708775" y="993254"/>
             <a:chExt cx="1121258" cy="500416"/>
@@ -14466,7 +14466,7 @@
         </p:nvGrpSpPr>
         <p:grpSpPr>
           <a:xfrm>
-            <a:off x="4297259" y="5401770"/>
+            <a:off x="4358083" y="5626983"/>
             <a:ext cx="1121258" cy="793535"/>
             <a:chOff x="4297259" y="5401770"/>
             <a:chExt cx="1121258" cy="793535"/>
@@ -25357,6 +25357,335 @@
           </p:txBody>
         </p:sp>
       </p:grpSp>
+      <p:grpSp>
+        <p:nvGrpSpPr>
+          <p:cNvPr id="67" name="Group 66">
+            <a:extLst>
+              <a:ext uri="{FF2B5EF4-FFF2-40B4-BE49-F238E27FC236}">
+                <a16:creationId xmlns:a16="http://schemas.microsoft.com/office/drawing/2014/main" id="{722BAFF2-60E6-4E28-85BE-30A49E41911B}"/>
+              </a:ext>
+            </a:extLst>
+          </p:cNvPr>
+          <p:cNvGrpSpPr/>
+          <p:nvPr/>
+        </p:nvGrpSpPr>
+        <p:grpSpPr>
+          <a:xfrm>
+            <a:off x="4429843" y="3802584"/>
+            <a:ext cx="1121258" cy="810265"/>
+            <a:chOff x="10251337" y="4236777"/>
+            <a:chExt cx="1121258" cy="810265"/>
+          </a:xfrm>
+        </p:grpSpPr>
+        <p:grpSp>
+          <p:nvGrpSpPr>
+            <p:cNvPr id="513" name="Group 512">
+              <a:extLst>
+                <a:ext uri="{FF2B5EF4-FFF2-40B4-BE49-F238E27FC236}">
+                  <a16:creationId xmlns:a16="http://schemas.microsoft.com/office/drawing/2014/main" id="{170CE751-1DD2-4D1B-84C5-DB292A30B10E}"/>
+                </a:ext>
+              </a:extLst>
+            </p:cNvPr>
+            <p:cNvGrpSpPr/>
+            <p:nvPr/>
+          </p:nvGrpSpPr>
+          <p:grpSpPr>
+            <a:xfrm>
+              <a:off x="10251337" y="4236777"/>
+              <a:ext cx="1121258" cy="810265"/>
+              <a:chOff x="5672336" y="4288115"/>
+              <a:chExt cx="1121258" cy="810265"/>
+            </a:xfrm>
+          </p:grpSpPr>
+          <p:grpSp>
+            <p:nvGrpSpPr>
+              <p:cNvPr id="515" name="Group 514">
+                <a:extLst>
+                  <a:ext uri="{FF2B5EF4-FFF2-40B4-BE49-F238E27FC236}">
+                    <a16:creationId xmlns:a16="http://schemas.microsoft.com/office/drawing/2014/main" id="{8C259BAD-1896-4BBB-B4AD-65AD69D45472}"/>
+                  </a:ext>
+                </a:extLst>
+              </p:cNvPr>
+              <p:cNvGrpSpPr/>
+              <p:nvPr/>
+            </p:nvGrpSpPr>
+            <p:grpSpPr>
+              <a:xfrm>
+                <a:off x="6024611" y="4288115"/>
+                <a:ext cx="410614" cy="259710"/>
+                <a:chOff x="6024611" y="4288115"/>
+                <a:chExt cx="410614" cy="259710"/>
+              </a:xfrm>
+            </p:grpSpPr>
+            <p:sp>
+              <p:nvSpPr>
+                <p:cNvPr id="517" name="Rectangle 516">
+                  <a:extLst>
+                    <a:ext uri="{FF2B5EF4-FFF2-40B4-BE49-F238E27FC236}">
+                      <a16:creationId xmlns:a16="http://schemas.microsoft.com/office/drawing/2014/main" id="{166B897E-2D85-4F7F-AA03-E4FF771AB278}"/>
+                    </a:ext>
+                  </a:extLst>
+                </p:cNvPr>
+                <p:cNvSpPr/>
+                <p:nvPr/>
+              </p:nvSpPr>
+              <p:spPr>
+                <a:xfrm>
+                  <a:off x="6024611" y="4288115"/>
+                  <a:ext cx="338471" cy="252108"/>
+                </a:xfrm>
+                <a:prstGeom prst="rect">
+                  <a:avLst/>
+                </a:prstGeom>
+              </p:spPr>
+              <p:style>
+                <a:lnRef idx="2">
+                  <a:schemeClr val="accent1">
+                    <a:shade val="50000"/>
+                  </a:schemeClr>
+                </a:lnRef>
+                <a:fillRef idx="1">
+                  <a:schemeClr val="accent1"/>
+                </a:fillRef>
+                <a:effectRef idx="0">
+                  <a:schemeClr val="accent1"/>
+                </a:effectRef>
+                <a:fontRef idx="minor">
+                  <a:schemeClr val="lt1"/>
+                </a:fontRef>
+              </p:style>
+              <p:txBody>
+                <a:bodyPr rtlCol="0" anchor="ctr"/>
+                <a:lstStyle/>
+                <a:p>
+                  <a:pPr algn="ctr"/>
+                  <a:endParaRPr lang="en-US"/>
+                </a:p>
+              </p:txBody>
+            </p:sp>
+            <p:sp>
+              <p:nvSpPr>
+                <p:cNvPr id="518" name="Parallelogram 517">
+                  <a:extLst>
+                    <a:ext uri="{FF2B5EF4-FFF2-40B4-BE49-F238E27FC236}">
+                      <a16:creationId xmlns:a16="http://schemas.microsoft.com/office/drawing/2014/main" id="{9EAB8543-15B7-4EB3-B5D0-961C8B6713D5}"/>
+                    </a:ext>
+                  </a:extLst>
+                </p:cNvPr>
+                <p:cNvSpPr/>
+                <p:nvPr/>
+              </p:nvSpPr>
+              <p:spPr>
+                <a:xfrm>
+                  <a:off x="6035964" y="4324263"/>
+                  <a:ext cx="399261" cy="223562"/>
+                </a:xfrm>
+                <a:prstGeom prst="parallelogram">
+                  <a:avLst/>
+                </a:prstGeom>
+              </p:spPr>
+              <p:style>
+                <a:lnRef idx="2">
+                  <a:schemeClr val="accent1">
+                    <a:shade val="50000"/>
+                  </a:schemeClr>
+                </a:lnRef>
+                <a:fillRef idx="1">
+                  <a:schemeClr val="accent1"/>
+                </a:fillRef>
+                <a:effectRef idx="0">
+                  <a:schemeClr val="accent1"/>
+                </a:effectRef>
+                <a:fontRef idx="minor">
+                  <a:schemeClr val="lt1"/>
+                </a:fontRef>
+              </p:style>
+              <p:txBody>
+                <a:bodyPr rtlCol="0" anchor="ctr"/>
+                <a:lstStyle/>
+                <a:p>
+                  <a:pPr algn="ctr"/>
+                  <a:endParaRPr lang="en-US"/>
+                </a:p>
+              </p:txBody>
+            </p:sp>
+          </p:grpSp>
+          <p:sp>
+            <p:nvSpPr>
+              <p:cNvPr id="516" name="TextBox 515">
+                <a:extLst>
+                  <a:ext uri="{FF2B5EF4-FFF2-40B4-BE49-F238E27FC236}">
+                    <a16:creationId xmlns:a16="http://schemas.microsoft.com/office/drawing/2014/main" id="{8A6B9456-4E54-4CCD-87BD-CCFFD3D16D08}"/>
+                  </a:ext>
+                </a:extLst>
+              </p:cNvPr>
+              <p:cNvSpPr txBox="1"/>
+              <p:nvPr/>
+            </p:nvSpPr>
+            <p:spPr>
+              <a:xfrm>
+                <a:off x="5672336" y="4698270"/>
+                <a:ext cx="1121258" cy="400110"/>
+              </a:xfrm>
+              <a:prstGeom prst="rect">
+                <a:avLst/>
+              </a:prstGeom>
+              <a:noFill/>
+            </p:spPr>
+            <p:txBody>
+              <a:bodyPr wrap="square" rtlCol="0">
+                <a:spAutoFit/>
+              </a:bodyPr>
+              <a:lstStyle/>
+              <a:p>
+                <a:pPr algn="ctr"/>
+                <a:r>
+                  <a:rPr lang="en-US" sz="1000" dirty="0"/>
+                  <a:t>Mounted Network Folder</a:t>
+                </a:r>
+              </a:p>
+            </p:txBody>
+          </p:sp>
+        </p:grpSp>
+        <p:sp>
+          <p:nvSpPr>
+            <p:cNvPr id="65" name="Rectangle 64">
+              <a:extLst>
+                <a:ext uri="{FF2B5EF4-FFF2-40B4-BE49-F238E27FC236}">
+                  <a16:creationId xmlns:a16="http://schemas.microsoft.com/office/drawing/2014/main" id="{5CB731D4-8FD7-454A-B802-137E8DFB4B1A}"/>
+                </a:ext>
+              </a:extLst>
+            </p:cNvPr>
+            <p:cNvSpPr/>
+            <p:nvPr/>
+          </p:nvSpPr>
+          <p:spPr>
+            <a:xfrm>
+              <a:off x="10462260" y="4577235"/>
+              <a:ext cx="657657" cy="45719"/>
+            </a:xfrm>
+            <a:prstGeom prst="rect">
+              <a:avLst/>
+            </a:prstGeom>
+          </p:spPr>
+          <p:style>
+            <a:lnRef idx="2">
+              <a:schemeClr val="accent1">
+                <a:shade val="50000"/>
+              </a:schemeClr>
+            </a:lnRef>
+            <a:fillRef idx="1">
+              <a:schemeClr val="accent1"/>
+            </a:fillRef>
+            <a:effectRef idx="0">
+              <a:schemeClr val="accent1"/>
+            </a:effectRef>
+            <a:fontRef idx="minor">
+              <a:schemeClr val="lt1"/>
+            </a:fontRef>
+          </p:style>
+          <p:txBody>
+            <a:bodyPr rtlCol="0" anchor="ctr"/>
+            <a:lstStyle/>
+            <a:p>
+              <a:pPr algn="ctr"/>
+              <a:endParaRPr lang="en-US"/>
+            </a:p>
+          </p:txBody>
+        </p:sp>
+        <p:sp>
+          <p:nvSpPr>
+            <p:cNvPr id="577" name="Rectangle 576">
+              <a:extLst>
+                <a:ext uri="{FF2B5EF4-FFF2-40B4-BE49-F238E27FC236}">
+                  <a16:creationId xmlns:a16="http://schemas.microsoft.com/office/drawing/2014/main" id="{F6F49F53-7CA9-4274-B6F9-D8093C28A3A0}"/>
+                </a:ext>
+              </a:extLst>
+            </p:cNvPr>
+            <p:cNvSpPr/>
+            <p:nvPr/>
+          </p:nvSpPr>
+          <p:spPr>
+            <a:xfrm rot="5400000" flipV="1">
+              <a:off x="10748183" y="4514363"/>
+              <a:ext cx="81846" cy="45719"/>
+            </a:xfrm>
+            <a:prstGeom prst="rect">
+              <a:avLst/>
+            </a:prstGeom>
+          </p:spPr>
+          <p:style>
+            <a:lnRef idx="2">
+              <a:schemeClr val="accent1">
+                <a:shade val="50000"/>
+              </a:schemeClr>
+            </a:lnRef>
+            <a:fillRef idx="1">
+              <a:schemeClr val="accent1"/>
+            </a:fillRef>
+            <a:effectRef idx="0">
+              <a:schemeClr val="accent1"/>
+            </a:effectRef>
+            <a:fontRef idx="minor">
+              <a:schemeClr val="lt1"/>
+            </a:fontRef>
+          </p:style>
+          <p:txBody>
+            <a:bodyPr rtlCol="0" anchor="ctr"/>
+            <a:lstStyle/>
+            <a:p>
+              <a:pPr algn="ctr"/>
+              <a:endParaRPr lang="en-US"/>
+            </a:p>
+          </p:txBody>
+        </p:sp>
+        <p:sp>
+          <p:nvSpPr>
+            <p:cNvPr id="579" name="Rectangle 578">
+              <a:extLst>
+                <a:ext uri="{FF2B5EF4-FFF2-40B4-BE49-F238E27FC236}">
+                  <a16:creationId xmlns:a16="http://schemas.microsoft.com/office/drawing/2014/main" id="{8B81F7F6-B978-4C2E-B626-E889C41337AF}"/>
+                </a:ext>
+              </a:extLst>
+            </p:cNvPr>
+            <p:cNvSpPr/>
+            <p:nvPr/>
+          </p:nvSpPr>
+          <p:spPr>
+            <a:xfrm>
+              <a:off x="10754080" y="4558628"/>
+              <a:ext cx="75537" cy="73954"/>
+            </a:xfrm>
+            <a:prstGeom prst="rect">
+              <a:avLst/>
+            </a:prstGeom>
+          </p:spPr>
+          <p:style>
+            <a:lnRef idx="2">
+              <a:schemeClr val="accent1">
+                <a:shade val="50000"/>
+              </a:schemeClr>
+            </a:lnRef>
+            <a:fillRef idx="1">
+              <a:schemeClr val="accent1"/>
+            </a:fillRef>
+            <a:effectRef idx="0">
+              <a:schemeClr val="accent1"/>
+            </a:effectRef>
+            <a:fontRef idx="minor">
+              <a:schemeClr val="lt1"/>
+            </a:fontRef>
+          </p:style>
+          <p:txBody>
+            <a:bodyPr rtlCol="0" anchor="ctr"/>
+            <a:lstStyle/>
+            <a:p>
+              <a:pPr algn="ctr"/>
+              <a:endParaRPr lang="en-US"/>
+            </a:p>
+          </p:txBody>
+        </p:sp>
+      </p:grpSp>
     </p:spTree>
     <p:extLst>
       <p:ext uri="{BB962C8B-B14F-4D97-AF65-F5344CB8AC3E}">

</xml_diff>